<commit_message>
Deploy to GitHub Pages: f5936427488fc26b97a583540f2dfb11fa8c9233
</commit_message>
<xml_diff>
--- a/assets/images/logos/logo.pptx
+++ b/assets/images/logos/logo.pptx
@@ -291,7 +291,7 @@
           <a:p>
             <a:fld id="{06F0D87A-DAEC-084F-9C2D-C52D40C0F85F}" type="datetimeFigureOut">
               <a:rPr lang="en-US" smtClean="0"/>
-              <a:t>10/19/25</a:t>
+              <a:t>10/28/25</a:t>
             </a:fld>
             <a:endParaRPr lang="en-US"/>
           </a:p>
@@ -489,7 +489,7 @@
           <a:p>
             <a:fld id="{06F0D87A-DAEC-084F-9C2D-C52D40C0F85F}" type="datetimeFigureOut">
               <a:rPr lang="en-US" smtClean="0"/>
-              <a:t>10/19/25</a:t>
+              <a:t>10/28/25</a:t>
             </a:fld>
             <a:endParaRPr lang="en-US"/>
           </a:p>
@@ -697,7 +697,7 @@
           <a:p>
             <a:fld id="{06F0D87A-DAEC-084F-9C2D-C52D40C0F85F}" type="datetimeFigureOut">
               <a:rPr lang="en-US" smtClean="0"/>
-              <a:t>10/19/25</a:t>
+              <a:t>10/28/25</a:t>
             </a:fld>
             <a:endParaRPr lang="en-US"/>
           </a:p>
@@ -895,7 +895,7 @@
           <a:p>
             <a:fld id="{06F0D87A-DAEC-084F-9C2D-C52D40C0F85F}" type="datetimeFigureOut">
               <a:rPr lang="en-US" smtClean="0"/>
-              <a:t>10/19/25</a:t>
+              <a:t>10/28/25</a:t>
             </a:fld>
             <a:endParaRPr lang="en-US"/>
           </a:p>
@@ -1170,7 +1170,7 @@
           <a:p>
             <a:fld id="{06F0D87A-DAEC-084F-9C2D-C52D40C0F85F}" type="datetimeFigureOut">
               <a:rPr lang="en-US" smtClean="0"/>
-              <a:t>10/19/25</a:t>
+              <a:t>10/28/25</a:t>
             </a:fld>
             <a:endParaRPr lang="en-US"/>
           </a:p>
@@ -1435,7 +1435,7 @@
           <a:p>
             <a:fld id="{06F0D87A-DAEC-084F-9C2D-C52D40C0F85F}" type="datetimeFigureOut">
               <a:rPr lang="en-US" smtClean="0"/>
-              <a:t>10/19/25</a:t>
+              <a:t>10/28/25</a:t>
             </a:fld>
             <a:endParaRPr lang="en-US"/>
           </a:p>
@@ -1847,7 +1847,7 @@
           <a:p>
             <a:fld id="{06F0D87A-DAEC-084F-9C2D-C52D40C0F85F}" type="datetimeFigureOut">
               <a:rPr lang="en-US" smtClean="0"/>
-              <a:t>10/19/25</a:t>
+              <a:t>10/28/25</a:t>
             </a:fld>
             <a:endParaRPr lang="en-US"/>
           </a:p>
@@ -1988,7 +1988,7 @@
           <a:p>
             <a:fld id="{06F0D87A-DAEC-084F-9C2D-C52D40C0F85F}" type="datetimeFigureOut">
               <a:rPr lang="en-US" smtClean="0"/>
-              <a:t>10/19/25</a:t>
+              <a:t>10/28/25</a:t>
             </a:fld>
             <a:endParaRPr lang="en-US"/>
           </a:p>
@@ -2101,7 +2101,7 @@
           <a:p>
             <a:fld id="{06F0D87A-DAEC-084F-9C2D-C52D40C0F85F}" type="datetimeFigureOut">
               <a:rPr lang="en-US" smtClean="0"/>
-              <a:t>10/19/25</a:t>
+              <a:t>10/28/25</a:t>
             </a:fld>
             <a:endParaRPr lang="en-US"/>
           </a:p>
@@ -2412,7 +2412,7 @@
           <a:p>
             <a:fld id="{06F0D87A-DAEC-084F-9C2D-C52D40C0F85F}" type="datetimeFigureOut">
               <a:rPr lang="en-US" smtClean="0"/>
-              <a:t>10/19/25</a:t>
+              <a:t>10/28/25</a:t>
             </a:fld>
             <a:endParaRPr lang="en-US"/>
           </a:p>
@@ -2700,7 +2700,7 @@
           <a:p>
             <a:fld id="{06F0D87A-DAEC-084F-9C2D-C52D40C0F85F}" type="datetimeFigureOut">
               <a:rPr lang="en-US" smtClean="0"/>
-              <a:t>10/19/25</a:t>
+              <a:t>10/28/25</a:t>
             </a:fld>
             <a:endParaRPr lang="en-US"/>
           </a:p>
@@ -2941,7 +2941,7 @@
           <a:p>
             <a:fld id="{06F0D87A-DAEC-084F-9C2D-C52D40C0F85F}" type="datetimeFigureOut">
               <a:rPr lang="en-US" smtClean="0"/>
-              <a:t>10/19/25</a:t>
+              <a:t>10/28/25</a:t>
             </a:fld>
             <a:endParaRPr lang="en-US"/>
           </a:p>
@@ -9225,6 +9225,58 @@
           <a:chExt cx="0" cy="0"/>
         </a:xfrm>
       </p:grpSpPr>
+      <p:sp>
+        <p:nvSpPr>
+          <p:cNvPr id="45" name="Rectangle 44">
+            <a:extLst>
+              <a:ext uri="{FF2B5EF4-FFF2-40B4-BE49-F238E27FC236}">
+                <a16:creationId xmlns:a16="http://schemas.microsoft.com/office/drawing/2014/main" id="{5FF4AF4D-A77F-187F-F9C8-4B637AE9CDC9}"/>
+              </a:ext>
+            </a:extLst>
+          </p:cNvPr>
+          <p:cNvSpPr/>
+          <p:nvPr/>
+        </p:nvSpPr>
+        <p:spPr>
+          <a:xfrm>
+            <a:off x="457200" y="952500"/>
+            <a:ext cx="3057438" cy="1409700"/>
+          </a:xfrm>
+          <a:prstGeom prst="rect">
+            <a:avLst/>
+          </a:prstGeom>
+          <a:solidFill>
+            <a:schemeClr val="bg1"/>
+          </a:solidFill>
+          <a:ln>
+            <a:noFill/>
+          </a:ln>
+        </p:spPr>
+        <p:style>
+          <a:lnRef idx="2">
+            <a:schemeClr val="accent1">
+              <a:shade val="15000"/>
+            </a:schemeClr>
+          </a:lnRef>
+          <a:fillRef idx="1">
+            <a:schemeClr val="accent1"/>
+          </a:fillRef>
+          <a:effectRef idx="0">
+            <a:schemeClr val="accent1"/>
+          </a:effectRef>
+          <a:fontRef idx="minor">
+            <a:schemeClr val="lt1"/>
+          </a:fontRef>
+        </p:style>
+        <p:txBody>
+          <a:bodyPr rtlCol="0" anchor="ctr"/>
+          <a:lstStyle/>
+          <a:p>
+            <a:pPr algn="ctr"/>
+            <a:endParaRPr lang="en-US"/>
+          </a:p>
+        </p:txBody>
+      </p:sp>
       <p:sp>
         <p:nvSpPr>
           <p:cNvPr id="20" name="TextBox 19">

</xml_diff>